<commit_message>
Fin del tema 3
Falta por completar funciones flecha
</commit_message>
<xml_diff>
--- a/JAVASCRIPT/TEMA 3.pptx
+++ b/JAVASCRIPT/TEMA 3.pptx
@@ -5,7 +5,7 @@
     <p:sldMasterId id="2147483660" r:id="rId1"/>
   </p:sldMasterIdLst>
   <p:notesMasterIdLst>
-    <p:notesMasterId r:id="rId9"/>
+    <p:notesMasterId r:id="rId10"/>
   </p:notesMasterIdLst>
   <p:sldIdLst>
     <p:sldId id="256" r:id="rId2"/>
@@ -15,6 +15,7 @@
     <p:sldId id="260" r:id="rId6"/>
     <p:sldId id="262" r:id="rId7"/>
     <p:sldId id="263" r:id="rId8"/>
+    <p:sldId id="264" r:id="rId9"/>
   </p:sldIdLst>
   <p:sldSz cx="12192000" cy="6858000"/>
   <p:notesSz cx="6858000" cy="9144000"/>
@@ -233,7 +234,7 @@
           <a:p>
             <a:fld id="{391F017E-414B-4B95-B592-C344CC6A0CA9}" type="datetimeFigureOut">
               <a:rPr lang="es-ES" smtClean="0"/>
-              <a:t>30/11/2020</a:t>
+              <a:t>02/12/2020</a:t>
             </a:fld>
             <a:endParaRPr lang="es-ES"/>
           </a:p>
@@ -9143,10 +9144,391 @@
           </a:p>
         </p:txBody>
       </p:sp>
+      <p:sp>
+        <p:nvSpPr>
+          <p:cNvPr id="5" name="CuadroTexto 4">
+            <a:extLst>
+              <a:ext uri="{FF2B5EF4-FFF2-40B4-BE49-F238E27FC236}">
+                <a16:creationId xmlns:a16="http://schemas.microsoft.com/office/drawing/2014/main" id="{CB6CF61B-0B44-42B4-B58C-03EEFA20B6F1}"/>
+              </a:ext>
+            </a:extLst>
+          </p:cNvPr>
+          <p:cNvSpPr txBox="1"/>
+          <p:nvPr/>
+        </p:nvSpPr>
+        <p:spPr>
+          <a:xfrm>
+            <a:off x="838200" y="1100225"/>
+            <a:ext cx="10665178" cy="646331"/>
+          </a:xfrm>
+          <a:prstGeom prst="rect">
+            <a:avLst/>
+          </a:prstGeom>
+          <a:noFill/>
+        </p:spPr>
+        <p:txBody>
+          <a:bodyPr wrap="square">
+            <a:spAutoFit/>
+          </a:bodyPr>
+          <a:lstStyle/>
+          <a:p>
+            <a:r>
+              <a:rPr lang="es-ES" dirty="0"/>
+              <a:t>En JavaScript, los parámetros de las funciones están predeterminados en </a:t>
+            </a:r>
+            <a:r>
+              <a:rPr lang="es-ES" dirty="0" err="1"/>
+              <a:t>undefined</a:t>
+            </a:r>
+            <a:r>
+              <a:rPr lang="es-ES" dirty="0"/>
+              <a:t>. Sin embargo, en algunas situaciones puede resultar útil establecer un valor predeterminado diferente.</a:t>
+            </a:r>
+          </a:p>
+        </p:txBody>
+      </p:sp>
+      <p:sp>
+        <p:nvSpPr>
+          <p:cNvPr id="7" name="CuadroTexto 6">
+            <a:extLst>
+              <a:ext uri="{FF2B5EF4-FFF2-40B4-BE49-F238E27FC236}">
+                <a16:creationId xmlns:a16="http://schemas.microsoft.com/office/drawing/2014/main" id="{DA626040-885F-417A-8C5D-DD446DDDCEB7}"/>
+              </a:ext>
+            </a:extLst>
+          </p:cNvPr>
+          <p:cNvSpPr txBox="1"/>
+          <p:nvPr/>
+        </p:nvSpPr>
+        <p:spPr>
+          <a:xfrm>
+            <a:off x="838200" y="1767281"/>
+            <a:ext cx="6101644" cy="1200329"/>
+          </a:xfrm>
+          <a:prstGeom prst="rect">
+            <a:avLst/>
+          </a:prstGeom>
+          <a:noFill/>
+        </p:spPr>
+        <p:txBody>
+          <a:bodyPr wrap="square">
+            <a:spAutoFit/>
+          </a:bodyPr>
+          <a:lstStyle/>
+          <a:p>
+            <a:r>
+              <a:rPr lang="es-ES" dirty="0"/>
+              <a:t>Con parámetros predeterminados, ya no es necesaria una verificación manual en el cuerpo de la función. Simplemente puedes poner 1 como valor predeterminado para b en el encabezado de la función:</a:t>
+            </a:r>
+          </a:p>
+        </p:txBody>
+      </p:sp>
+      <p:pic>
+        <p:nvPicPr>
+          <p:cNvPr id="9" name="Imagen 8">
+            <a:extLst>
+              <a:ext uri="{FF2B5EF4-FFF2-40B4-BE49-F238E27FC236}">
+                <a16:creationId xmlns:a16="http://schemas.microsoft.com/office/drawing/2014/main" id="{2CDB5558-7B5B-4CA0-845F-19A29E86025A}"/>
+              </a:ext>
+            </a:extLst>
+          </p:cNvPr>
+          <p:cNvPicPr>
+            <a:picLocks noChangeAspect="1"/>
+          </p:cNvPicPr>
+          <p:nvPr/>
+        </p:nvPicPr>
+        <p:blipFill>
+          <a:blip r:embed="rId2"/>
+          <a:stretch>
+            <a:fillRect/>
+          </a:stretch>
+        </p:blipFill>
+        <p:spPr>
+          <a:xfrm>
+            <a:off x="7131502" y="1767281"/>
+            <a:ext cx="4467225" cy="1876425"/>
+          </a:xfrm>
+          <a:prstGeom prst="rect">
+            <a:avLst/>
+          </a:prstGeom>
+        </p:spPr>
+      </p:pic>
+      <p:sp>
+        <p:nvSpPr>
+          <p:cNvPr id="11" name="CuadroTexto 10">
+            <a:extLst>
+              <a:ext uri="{FF2B5EF4-FFF2-40B4-BE49-F238E27FC236}">
+                <a16:creationId xmlns:a16="http://schemas.microsoft.com/office/drawing/2014/main" id="{FC8D5814-F080-4688-A179-87C9A589A38D}"/>
+              </a:ext>
+            </a:extLst>
+          </p:cNvPr>
+          <p:cNvSpPr txBox="1"/>
+          <p:nvPr/>
+        </p:nvSpPr>
+        <p:spPr>
+          <a:xfrm>
+            <a:off x="838200" y="3089491"/>
+            <a:ext cx="6101644" cy="369332"/>
+          </a:xfrm>
+          <a:prstGeom prst="rect">
+            <a:avLst/>
+          </a:prstGeom>
+          <a:noFill/>
+        </p:spPr>
+        <p:txBody>
+          <a:bodyPr wrap="square">
+            <a:spAutoFit/>
+          </a:bodyPr>
+          <a:lstStyle/>
+          <a:p>
+            <a:r>
+              <a:rPr lang="es-ES" b="1" dirty="0"/>
+              <a:t>Parámetros </a:t>
+            </a:r>
+            <a:r>
+              <a:rPr lang="es-ES" b="1" dirty="0" err="1"/>
+              <a:t>rest</a:t>
+            </a:r>
+            <a:endParaRPr lang="es-ES" b="1" dirty="0"/>
+          </a:p>
+        </p:txBody>
+      </p:sp>
+      <p:sp>
+        <p:nvSpPr>
+          <p:cNvPr id="13" name="CuadroTexto 12">
+            <a:extLst>
+              <a:ext uri="{FF2B5EF4-FFF2-40B4-BE49-F238E27FC236}">
+                <a16:creationId xmlns:a16="http://schemas.microsoft.com/office/drawing/2014/main" id="{59633C36-3567-4782-95C2-D199B5B7C5CC}"/>
+              </a:ext>
+            </a:extLst>
+          </p:cNvPr>
+          <p:cNvSpPr txBox="1"/>
+          <p:nvPr/>
+        </p:nvSpPr>
+        <p:spPr>
+          <a:xfrm>
+            <a:off x="750965" y="3458823"/>
+            <a:ext cx="6101644" cy="646331"/>
+          </a:xfrm>
+          <a:prstGeom prst="rect">
+            <a:avLst/>
+          </a:prstGeom>
+          <a:noFill/>
+        </p:spPr>
+        <p:txBody>
+          <a:bodyPr wrap="square">
+            <a:spAutoFit/>
+          </a:bodyPr>
+          <a:lstStyle/>
+          <a:p>
+            <a:r>
+              <a:rPr lang="es-ES" dirty="0"/>
+              <a:t>La sintaxis del parámetro </a:t>
+            </a:r>
+            <a:r>
+              <a:rPr lang="es-ES" dirty="0" err="1"/>
+              <a:t>rest</a:t>
+            </a:r>
+            <a:r>
+              <a:rPr lang="es-ES" dirty="0"/>
+              <a:t> nos permite representar un número indefinido de argumentos como un arreglo.</a:t>
+            </a:r>
+          </a:p>
+        </p:txBody>
+      </p:sp>
+      <p:pic>
+        <p:nvPicPr>
+          <p:cNvPr id="17" name="Imagen 16">
+            <a:extLst>
+              <a:ext uri="{FF2B5EF4-FFF2-40B4-BE49-F238E27FC236}">
+                <a16:creationId xmlns:a16="http://schemas.microsoft.com/office/drawing/2014/main" id="{5D3B61D6-126A-4584-9729-3E020D048486}"/>
+              </a:ext>
+            </a:extLst>
+          </p:cNvPr>
+          <p:cNvPicPr>
+            <a:picLocks noChangeAspect="1"/>
+          </p:cNvPicPr>
+          <p:nvPr/>
+        </p:nvPicPr>
+        <p:blipFill>
+          <a:blip r:embed="rId3"/>
+          <a:stretch>
+            <a:fillRect/>
+          </a:stretch>
+        </p:blipFill>
+        <p:spPr>
+          <a:xfrm>
+            <a:off x="827264" y="4125879"/>
+            <a:ext cx="5343525" cy="2171700"/>
+          </a:xfrm>
+          <a:prstGeom prst="rect">
+            <a:avLst/>
+          </a:prstGeom>
+        </p:spPr>
+      </p:pic>
     </p:spTree>
     <p:extLst>
       <p:ext uri="{BB962C8B-B14F-4D97-AF65-F5344CB8AC3E}">
         <p14:creationId xmlns:p14="http://schemas.microsoft.com/office/powerpoint/2010/main" val="70781029"/>
+      </p:ext>
+    </p:extLst>
+  </p:cSld>
+  <p:clrMapOvr>
+    <a:masterClrMapping/>
+  </p:clrMapOvr>
+  <mc:AlternateContent xmlns:mc="http://schemas.openxmlformats.org/markup-compatibility/2006" xmlns:p14="http://schemas.microsoft.com/office/powerpoint/2010/main">
+    <mc:Choice Requires="p14">
+      <p:transition spd="med" p14:dur="700">
+        <p:fade/>
+      </p:transition>
+    </mc:Choice>
+    <mc:Fallback xmlns="">
+      <p:transition spd="med">
+        <p:fade/>
+      </p:transition>
+    </mc:Fallback>
+  </mc:AlternateContent>
+</p:sld>
+</file>
+
+<file path=ppt/slides/slide8.xml><?xml version="1.0" encoding="utf-8"?>
+<p:sld xmlns:a="http://schemas.openxmlformats.org/drawingml/2006/main" xmlns:r="http://schemas.openxmlformats.org/officeDocument/2006/relationships" xmlns:p="http://schemas.openxmlformats.org/presentationml/2006/main">
+  <p:cSld>
+    <p:spTree>
+      <p:nvGrpSpPr>
+        <p:cNvPr id="1" name=""/>
+        <p:cNvGrpSpPr/>
+        <p:nvPr/>
+      </p:nvGrpSpPr>
+      <p:grpSpPr>
+        <a:xfrm>
+          <a:off x="0" y="0"/>
+          <a:ext cx="0" cy="0"/>
+          <a:chOff x="0" y="0"/>
+          <a:chExt cx="0" cy="0"/>
+        </a:xfrm>
+      </p:grpSpPr>
+      <p:sp>
+        <p:nvSpPr>
+          <p:cNvPr id="2" name="Título 1">
+            <a:extLst>
+              <a:ext uri="{FF2B5EF4-FFF2-40B4-BE49-F238E27FC236}">
+                <a16:creationId xmlns:a16="http://schemas.microsoft.com/office/drawing/2014/main" id="{73412C52-C7E7-460B-8F89-280975633842}"/>
+              </a:ext>
+            </a:extLst>
+          </p:cNvPr>
+          <p:cNvSpPr>
+            <a:spLocks noGrp="1"/>
+          </p:cNvSpPr>
+          <p:nvPr>
+            <p:ph type="title"/>
+          </p:nvPr>
+        </p:nvSpPr>
+        <p:spPr/>
+        <p:txBody>
+          <a:bodyPr>
+            <a:normAutofit fontScale="90000"/>
+          </a:bodyPr>
+          <a:lstStyle/>
+          <a:p>
+            <a:r>
+              <a:rPr lang="es-ES" dirty="0"/>
+              <a:t>Funciones Flecha</a:t>
+            </a:r>
+          </a:p>
+        </p:txBody>
+      </p:sp>
+      <p:sp>
+        <p:nvSpPr>
+          <p:cNvPr id="3" name="Marcador de número de diapositiva 2">
+            <a:extLst>
+              <a:ext uri="{FF2B5EF4-FFF2-40B4-BE49-F238E27FC236}">
+                <a16:creationId xmlns:a16="http://schemas.microsoft.com/office/drawing/2014/main" id="{3871BBB6-1ADB-4FD5-B13E-18A82D14B93C}"/>
+              </a:ext>
+            </a:extLst>
+          </p:cNvPr>
+          <p:cNvSpPr>
+            <a:spLocks noGrp="1"/>
+          </p:cNvSpPr>
+          <p:nvPr>
+            <p:ph type="sldNum" sz="quarter" idx="12"/>
+          </p:nvPr>
+        </p:nvSpPr>
+        <p:spPr/>
+        <p:txBody>
+          <a:bodyPr/>
+          <a:lstStyle/>
+          <a:p>
+            <a:fld id="{63118611-7822-7D46-8FF7-94E882FDEEE2}" type="slidenum">
+              <a:rPr lang="en-US" smtClean="0"/>
+              <a:t>8</a:t>
+            </a:fld>
+            <a:endParaRPr lang="en-US"/>
+          </a:p>
+        </p:txBody>
+      </p:sp>
+      <p:sp>
+        <p:nvSpPr>
+          <p:cNvPr id="5" name="CuadroTexto 4">
+            <a:extLst>
+              <a:ext uri="{FF2B5EF4-FFF2-40B4-BE49-F238E27FC236}">
+                <a16:creationId xmlns:a16="http://schemas.microsoft.com/office/drawing/2014/main" id="{AC062A91-CA83-47FA-B7DE-FE044A421163}"/>
+              </a:ext>
+            </a:extLst>
+          </p:cNvPr>
+          <p:cNvSpPr txBox="1"/>
+          <p:nvPr/>
+        </p:nvSpPr>
+        <p:spPr>
+          <a:xfrm>
+            <a:off x="838200" y="1215830"/>
+            <a:ext cx="11005456" cy="646331"/>
+          </a:xfrm>
+          <a:prstGeom prst="rect">
+            <a:avLst/>
+          </a:prstGeom>
+          <a:noFill/>
+        </p:spPr>
+        <p:txBody>
+          <a:bodyPr wrap="square">
+            <a:spAutoFit/>
+          </a:bodyPr>
+          <a:lstStyle/>
+          <a:p>
+            <a:r>
+              <a:rPr lang="es-ES" dirty="0"/>
+              <a:t>Una expresión de función flecha tiene una sintaxis más corta en comparación con las expresiones de función y no tiene su propio </a:t>
+            </a:r>
+            <a:r>
+              <a:rPr lang="es-ES" dirty="0" err="1"/>
+              <a:t>this</a:t>
+            </a:r>
+            <a:r>
+              <a:rPr lang="es-ES" dirty="0"/>
+              <a:t>, </a:t>
+            </a:r>
+            <a:r>
+              <a:rPr lang="es-ES" dirty="0" err="1"/>
+              <a:t>arguments</a:t>
+            </a:r>
+            <a:r>
+              <a:rPr lang="es-ES" dirty="0"/>
+              <a:t>, super o </a:t>
+            </a:r>
+            <a:r>
+              <a:rPr lang="es-ES" dirty="0" err="1"/>
+              <a:t>new.target</a:t>
+            </a:r>
+            <a:r>
+              <a:rPr lang="es-ES" dirty="0"/>
+              <a:t>. Las funciones flecha siempre son anónimas. </a:t>
+            </a:r>
+          </a:p>
+        </p:txBody>
+      </p:sp>
+    </p:spTree>
+    <p:extLst>
+      <p:ext uri="{BB962C8B-B14F-4D97-AF65-F5344CB8AC3E}">
+        <p14:creationId xmlns:p14="http://schemas.microsoft.com/office/powerpoint/2010/main" val="4113291970"/>
       </p:ext>
     </p:extLst>
   </p:cSld>

</xml_diff>